<commit_message>
Added video to UnivEDA Quant module
</commit_message>
<xml_diff>
--- a/modules/UnivEDA_Quantitative/PPT.pptx
+++ b/modules/UnivEDA_Quantitative/PPT.pptx
@@ -3849,7 +3849,6 @@
               <a:rPr lang="en-US" dirty="0"/>
               <a:t>Univariate EDA</a:t>
             </a:r>
-            <a:endParaRPr lang="en-US" dirty="0"/>
           </a:p>
         </p:txBody>
       </p:sp>
@@ -3879,15 +3878,7 @@
                   <a:srgbClr val="000000"/>
                 </a:solidFill>
               </a:rPr>
-              <a:t>Purpose – describe </a:t>
-            </a:r>
-            <a:r>
-              <a:rPr lang="en-US" dirty="0" smtClean="0">
-                <a:solidFill>
-                  <a:srgbClr val="000000"/>
-                </a:solidFill>
-              </a:rPr>
-              <a:t>the distribution</a:t>
+              <a:t>Purpose – describe the distribution</a:t>
             </a:r>
           </a:p>
           <a:p>
@@ -4678,7 +4669,7 @@
                             </p:stCondLst>
                             <p:childTnLst>
                               <p:par>
-                                <p:cTn id="5" presetID="26" presetClass="entr" presetSubtype="0" fill="hold" grpId="0" nodeType="clickEffect">
+                                <p:cTn id="5" presetID="1" presetClass="entr" presetSubtype="0" fill="hold" grpId="0" nodeType="clickEffect">
                                   <p:stCondLst>
                                     <p:cond delay="0"/>
                                   </p:stCondLst>
@@ -4701,257 +4692,6 @@
                                         <p:strVal val="visible"/>
                                       </p:to>
                                     </p:set>
-                                    <p:animEffect transition="in" filter="wipe(down)">
-                                      <p:cBhvr>
-                                        <p:cTn id="7" dur="580">
-                                          <p:stCondLst>
-                                            <p:cond delay="0"/>
-                                          </p:stCondLst>
-                                        </p:cTn>
-                                        <p:tgtEl>
-                                          <p:spTgt spid="179204"/>
-                                        </p:tgtEl>
-                                      </p:cBhvr>
-                                    </p:animEffect>
-                                    <p:anim calcmode="lin" valueType="num">
-                                      <p:cBhvr>
-                                        <p:cTn id="8" dur="1822" tmFilter="0,0; 0.14,0.36; 0.43,0.73; 0.71,0.91; 1.0,1.0">
-                                          <p:stCondLst>
-                                            <p:cond delay="0"/>
-                                          </p:stCondLst>
-                                        </p:cTn>
-                                        <p:tgtEl>
-                                          <p:spTgt spid="179204"/>
-                                        </p:tgtEl>
-                                        <p:attrNameLst>
-                                          <p:attrName>ppt_x</p:attrName>
-                                        </p:attrNameLst>
-                                      </p:cBhvr>
-                                      <p:tavLst>
-                                        <p:tav tm="0">
-                                          <p:val>
-                                            <p:strVal val="#ppt_x-0.25"/>
-                                          </p:val>
-                                        </p:tav>
-                                        <p:tav tm="100000">
-                                          <p:val>
-                                            <p:strVal val="#ppt_x"/>
-                                          </p:val>
-                                        </p:tav>
-                                      </p:tavLst>
-                                    </p:anim>
-                                    <p:anim calcmode="lin" valueType="num">
-                                      <p:cBhvr>
-                                        <p:cTn id="9" dur="664" tmFilter="0.0,0.0; 0.25,0.07; 0.50,0.2; 0.75,0.467; 1.0,1.0">
-                                          <p:stCondLst>
-                                            <p:cond delay="0"/>
-                                          </p:stCondLst>
-                                        </p:cTn>
-                                        <p:tgtEl>
-                                          <p:spTgt spid="179204"/>
-                                        </p:tgtEl>
-                                        <p:attrNameLst>
-                                          <p:attrName>ppt_y</p:attrName>
-                                        </p:attrNameLst>
-                                      </p:cBhvr>
-                                      <p:tavLst>
-                                        <p:tav tm="0" fmla="#ppt_y-sin(pi*$)/3">
-                                          <p:val>
-                                            <p:fltVal val="0.5"/>
-                                          </p:val>
-                                        </p:tav>
-                                        <p:tav tm="100000">
-                                          <p:val>
-                                            <p:fltVal val="1"/>
-                                          </p:val>
-                                        </p:tav>
-                                      </p:tavLst>
-                                    </p:anim>
-                                    <p:anim calcmode="lin" valueType="num">
-                                      <p:cBhvr>
-                                        <p:cTn id="10" dur="664" tmFilter="0, 0; 0.125,0.2665; 0.25,0.4; 0.375,0.465; 0.5,0.5;  0.625,0.535; 0.75,0.6; 0.875,0.7335; 1,1">
-                                          <p:stCondLst>
-                                            <p:cond delay="664"/>
-                                          </p:stCondLst>
-                                        </p:cTn>
-                                        <p:tgtEl>
-                                          <p:spTgt spid="179204"/>
-                                        </p:tgtEl>
-                                        <p:attrNameLst>
-                                          <p:attrName>ppt_y</p:attrName>
-                                        </p:attrNameLst>
-                                      </p:cBhvr>
-                                      <p:tavLst>
-                                        <p:tav tm="0" fmla="#ppt_y-sin(pi*$)/9">
-                                          <p:val>
-                                            <p:fltVal val="0"/>
-                                          </p:val>
-                                        </p:tav>
-                                        <p:tav tm="100000">
-                                          <p:val>
-                                            <p:fltVal val="1"/>
-                                          </p:val>
-                                        </p:tav>
-                                      </p:tavLst>
-                                    </p:anim>
-                                    <p:anim calcmode="lin" valueType="num">
-                                      <p:cBhvr>
-                                        <p:cTn id="11" dur="332" tmFilter="0, 0; 0.125,0.2665; 0.25,0.4; 0.375,0.465; 0.5,0.5;  0.625,0.535; 0.75,0.6; 0.875,0.7335; 1,1">
-                                          <p:stCondLst>
-                                            <p:cond delay="1324"/>
-                                          </p:stCondLst>
-                                        </p:cTn>
-                                        <p:tgtEl>
-                                          <p:spTgt spid="179204"/>
-                                        </p:tgtEl>
-                                        <p:attrNameLst>
-                                          <p:attrName>ppt_y</p:attrName>
-                                        </p:attrNameLst>
-                                      </p:cBhvr>
-                                      <p:tavLst>
-                                        <p:tav tm="0" fmla="#ppt_y-sin(pi*$)/27">
-                                          <p:val>
-                                            <p:fltVal val="0"/>
-                                          </p:val>
-                                        </p:tav>
-                                        <p:tav tm="100000">
-                                          <p:val>
-                                            <p:fltVal val="1"/>
-                                          </p:val>
-                                        </p:tav>
-                                      </p:tavLst>
-                                    </p:anim>
-                                    <p:anim calcmode="lin" valueType="num">
-                                      <p:cBhvr>
-                                        <p:cTn id="12" dur="164" tmFilter="0, 0; 0.125,0.2665; 0.25,0.4; 0.375,0.465; 0.5,0.5;  0.625,0.535; 0.75,0.6; 0.875,0.7335; 1,1">
-                                          <p:stCondLst>
-                                            <p:cond delay="1656"/>
-                                          </p:stCondLst>
-                                        </p:cTn>
-                                        <p:tgtEl>
-                                          <p:spTgt spid="179204"/>
-                                        </p:tgtEl>
-                                        <p:attrNameLst>
-                                          <p:attrName>ppt_y</p:attrName>
-                                        </p:attrNameLst>
-                                      </p:cBhvr>
-                                      <p:tavLst>
-                                        <p:tav tm="0" fmla="#ppt_y-sin(pi*$)/81">
-                                          <p:val>
-                                            <p:fltVal val="0"/>
-                                          </p:val>
-                                        </p:tav>
-                                        <p:tav tm="100000">
-                                          <p:val>
-                                            <p:fltVal val="1"/>
-                                          </p:val>
-                                        </p:tav>
-                                      </p:tavLst>
-                                    </p:anim>
-                                    <p:animScale>
-                                      <p:cBhvr>
-                                        <p:cTn id="13" dur="26">
-                                          <p:stCondLst>
-                                            <p:cond delay="650"/>
-                                          </p:stCondLst>
-                                        </p:cTn>
-                                        <p:tgtEl>
-                                          <p:spTgt spid="179204"/>
-                                        </p:tgtEl>
-                                      </p:cBhvr>
-                                      <p:to x="100000" y="60000"/>
-                                    </p:animScale>
-                                    <p:animScale>
-                                      <p:cBhvr>
-                                        <p:cTn id="14" dur="166" decel="50000">
-                                          <p:stCondLst>
-                                            <p:cond delay="676"/>
-                                          </p:stCondLst>
-                                        </p:cTn>
-                                        <p:tgtEl>
-                                          <p:spTgt spid="179204"/>
-                                        </p:tgtEl>
-                                      </p:cBhvr>
-                                      <p:to x="100000" y="100000"/>
-                                    </p:animScale>
-                                    <p:animScale>
-                                      <p:cBhvr>
-                                        <p:cTn id="15" dur="26">
-                                          <p:stCondLst>
-                                            <p:cond delay="1312"/>
-                                          </p:stCondLst>
-                                        </p:cTn>
-                                        <p:tgtEl>
-                                          <p:spTgt spid="179204"/>
-                                        </p:tgtEl>
-                                      </p:cBhvr>
-                                      <p:to x="100000" y="80000"/>
-                                    </p:animScale>
-                                    <p:animScale>
-                                      <p:cBhvr>
-                                        <p:cTn id="16" dur="166" decel="50000">
-                                          <p:stCondLst>
-                                            <p:cond delay="1338"/>
-                                          </p:stCondLst>
-                                        </p:cTn>
-                                        <p:tgtEl>
-                                          <p:spTgt spid="179204"/>
-                                        </p:tgtEl>
-                                      </p:cBhvr>
-                                      <p:to x="100000" y="100000"/>
-                                    </p:animScale>
-                                    <p:animScale>
-                                      <p:cBhvr>
-                                        <p:cTn id="17" dur="26">
-                                          <p:stCondLst>
-                                            <p:cond delay="1642"/>
-                                          </p:stCondLst>
-                                        </p:cTn>
-                                        <p:tgtEl>
-                                          <p:spTgt spid="179204"/>
-                                        </p:tgtEl>
-                                      </p:cBhvr>
-                                      <p:to x="100000" y="90000"/>
-                                    </p:animScale>
-                                    <p:animScale>
-                                      <p:cBhvr>
-                                        <p:cTn id="18" dur="166" decel="50000">
-                                          <p:stCondLst>
-                                            <p:cond delay="1668"/>
-                                          </p:stCondLst>
-                                        </p:cTn>
-                                        <p:tgtEl>
-                                          <p:spTgt spid="179204"/>
-                                        </p:tgtEl>
-                                      </p:cBhvr>
-                                      <p:to x="100000" y="100000"/>
-                                    </p:animScale>
-                                    <p:animScale>
-                                      <p:cBhvr>
-                                        <p:cTn id="19" dur="26">
-                                          <p:stCondLst>
-                                            <p:cond delay="1808"/>
-                                          </p:stCondLst>
-                                        </p:cTn>
-                                        <p:tgtEl>
-                                          <p:spTgt spid="179204"/>
-                                        </p:tgtEl>
-                                      </p:cBhvr>
-                                      <p:to x="100000" y="95000"/>
-                                    </p:animScale>
-                                    <p:animScale>
-                                      <p:cBhvr>
-                                        <p:cTn id="20" dur="166" decel="50000">
-                                          <p:stCondLst>
-                                            <p:cond delay="1834"/>
-                                          </p:stCondLst>
-                                        </p:cTn>
-                                        <p:tgtEl>
-                                          <p:spTgt spid="179204"/>
-                                        </p:tgtEl>
-                                      </p:cBhvr>
-                                      <p:to x="100000" y="100000"/>
-                                    </p:animScale>
                                   </p:childTnLst>
                                 </p:cTn>
                               </p:par>
@@ -5945,13 +5685,18 @@
           <a:lstStyle/>
           <a:p>
             <a:r>
-              <a:rPr lang="en-US" b="1" dirty="0" smtClean="0">
+              <a:rPr lang="en-US" b="1" smtClean="0">
                 <a:solidFill>
                   <a:srgbClr val="000000"/>
                 </a:solidFill>
               </a:rPr>
-              <a:t>Outlier</a:t>
-            </a:r>
+              <a:t>Outliers</a:t>
+            </a:r>
+            <a:endParaRPr lang="en-US" b="1" dirty="0" smtClean="0">
+              <a:solidFill>
+                <a:srgbClr val="000000"/>
+              </a:solidFill>
+            </a:endParaRPr>
           </a:p>
           <a:p>
             <a:pPr lvl="1"/>
@@ -7597,11 +7342,7 @@
           <a:p>
             <a:r>
               <a:rPr lang="en-US" i="1" dirty="0" smtClean="0"/>
-              <a:t>Describe </a:t>
-            </a:r>
-            <a:r>
-              <a:rPr lang="en-US" i="1" dirty="0" smtClean="0"/>
-              <a:t>a univariate EDA for the data in Figure 1 and Table 1.</a:t>
+              <a:t>Describe a univariate EDA for the data in Figure 1 and Table 1.</a:t>
             </a:r>
           </a:p>
         </p:txBody>
@@ -7759,7 +7500,23 @@
                   <a:srgbClr val="000000"/>
                 </a:solidFill>
               </a:rPr>
-              <a:t>righ</a:t>
+              <a:t>right-skewed and bimodal </a:t>
+            </a:r>
+            <a:r>
+              <a:rPr lang="en-US" sz="2000" dirty="0">
+                <a:solidFill>
+                  <a:srgbClr val="000000"/>
+                </a:solidFill>
+              </a:rPr>
+              <a:t>with</a:t>
+            </a:r>
+            <a:r>
+              <a:rPr lang="en-US" sz="2000" b="1" dirty="0">
+                <a:solidFill>
+                  <a:srgbClr val="000000"/>
+                </a:solidFill>
+              </a:rPr>
+              <a:t> </a:t>
             </a:r>
             <a:r>
               <a:rPr lang="en-US" sz="2000" b="1" dirty="0" smtClean="0">
@@ -7767,7 +7524,31 @@
                   <a:srgbClr val="000000"/>
                 </a:solidFill>
               </a:rPr>
-              <a:t>t-skewed and bimodal </a:t>
+              <a:t>an </a:t>
+            </a:r>
+            <a:r>
+              <a:rPr lang="en-US" sz="2000" b="1" dirty="0">
+                <a:solidFill>
+                  <a:srgbClr val="000000"/>
+                </a:solidFill>
+              </a:rPr>
+              <a:t>obvious </a:t>
+            </a:r>
+            <a:r>
+              <a:rPr lang="en-US" sz="2000" b="1" dirty="0" smtClean="0">
+                <a:solidFill>
+                  <a:srgbClr val="000000"/>
+                </a:solidFill>
+              </a:rPr>
+              <a:t>outlier at 13</a:t>
+            </a:r>
+            <a:r>
+              <a:rPr lang="en-US" sz="2000" dirty="0" smtClean="0">
+                <a:solidFill>
+                  <a:srgbClr val="000000"/>
+                </a:solidFill>
+              </a:rPr>
+              <a:t>, </a:t>
             </a:r>
             <a:r>
               <a:rPr lang="en-US" sz="2000" dirty="0">
@@ -7775,7 +7556,7 @@
                   <a:srgbClr val="000000"/>
                 </a:solidFill>
               </a:rPr>
-              <a:t>with</a:t>
+              <a:t>centered on a median of </a:t>
             </a:r>
             <a:r>
               <a:rPr lang="en-US" sz="2000" b="1" dirty="0">
@@ -7783,7 +7564,23 @@
                   <a:srgbClr val="000000"/>
                 </a:solidFill>
               </a:rPr>
-              <a:t> </a:t>
+              <a:t>4</a:t>
+            </a:r>
+            <a:r>
+              <a:rPr lang="en-US" sz="2000" dirty="0" smtClean="0">
+                <a:solidFill>
+                  <a:srgbClr val="000000"/>
+                </a:solidFill>
+              </a:rPr>
+              <a:t>, </a:t>
+            </a:r>
+            <a:r>
+              <a:rPr lang="en-US" sz="2000" dirty="0">
+                <a:solidFill>
+                  <a:srgbClr val="000000"/>
+                </a:solidFill>
+              </a:rPr>
+              <a:t>with an IQR from </a:t>
             </a:r>
             <a:r>
               <a:rPr lang="en-US" sz="2000" b="1" dirty="0" smtClean="0">
@@ -7791,7 +7588,15 @@
                   <a:srgbClr val="000000"/>
                 </a:solidFill>
               </a:rPr>
-              <a:t>an</a:t>
+              <a:t>2 </a:t>
+            </a:r>
+            <a:r>
+              <a:rPr lang="en-US" sz="2000" b="1" dirty="0">
+                <a:solidFill>
+                  <a:srgbClr val="000000"/>
+                </a:solidFill>
+              </a:rPr>
+              <a:t>to </a:t>
             </a:r>
             <a:r>
               <a:rPr lang="en-US" sz="2000" b="1" dirty="0" smtClean="0">
@@ -7799,119 +7604,31 @@
                   <a:srgbClr val="000000"/>
                 </a:solidFill>
               </a:rPr>
-              <a:t> </a:t>
-            </a:r>
-            <a:r>
-              <a:rPr lang="en-US" sz="2000" b="1" dirty="0">
+              <a:t>5 </a:t>
+            </a:r>
+            <a:r>
+              <a:rPr lang="en-US" sz="2000" dirty="0">
                 <a:solidFill>
                   <a:srgbClr val="000000"/>
                 </a:solidFill>
               </a:rPr>
-              <a:t>obvious </a:t>
-            </a:r>
-            <a:r>
-              <a:rPr lang="en-US" sz="2000" b="1" dirty="0" smtClean="0">
+              <a:t>(Figure </a:t>
+            </a:r>
+            <a:r>
+              <a:rPr lang="en-US" sz="2000" dirty="0" smtClean="0">
                 <a:solidFill>
                   <a:srgbClr val="000000"/>
                 </a:solidFill>
               </a:rPr>
-              <a:t>outlier at 13</a:t>
-            </a:r>
-            <a:r>
-              <a:rPr lang="en-US" sz="2000" dirty="0" smtClean="0">
+              <a:t>1; </a:t>
+            </a:r>
+            <a:r>
+              <a:rPr lang="en-US" sz="2000" dirty="0">
                 <a:solidFill>
                   <a:srgbClr val="000000"/>
                 </a:solidFill>
               </a:rPr>
-              <a:t>, </a:t>
-            </a:r>
-            <a:r>
-              <a:rPr lang="en-US" sz="2000" dirty="0">
-                <a:solidFill>
-                  <a:srgbClr val="000000"/>
-                </a:solidFill>
-              </a:rPr>
-              <a:t>centered on a median of </a:t>
-            </a:r>
-            <a:r>
-              <a:rPr lang="en-US" sz="2000" b="1" dirty="0">
-                <a:solidFill>
-                  <a:srgbClr val="000000"/>
-                </a:solidFill>
-              </a:rPr>
-              <a:t>4</a:t>
-            </a:r>
-            <a:r>
-              <a:rPr lang="en-US" sz="2000" dirty="0" smtClean="0">
-                <a:solidFill>
-                  <a:srgbClr val="000000"/>
-                </a:solidFill>
-              </a:rPr>
-              <a:t>, </a:t>
-            </a:r>
-            <a:r>
-              <a:rPr lang="en-US" sz="2000" dirty="0">
-                <a:solidFill>
-                  <a:srgbClr val="000000"/>
-                </a:solidFill>
-              </a:rPr>
-              <a:t>with an IQR from </a:t>
-            </a:r>
-            <a:r>
-              <a:rPr lang="en-US" sz="2000" b="1" dirty="0" smtClean="0">
-                <a:solidFill>
-                  <a:srgbClr val="000000"/>
-                </a:solidFill>
-              </a:rPr>
-              <a:t>2 </a:t>
-            </a:r>
-            <a:r>
-              <a:rPr lang="en-US" sz="2000" b="1" dirty="0">
-                <a:solidFill>
-                  <a:srgbClr val="000000"/>
-                </a:solidFill>
-              </a:rPr>
-              <a:t>to </a:t>
-            </a:r>
-            <a:r>
-              <a:rPr lang="en-US" sz="2000" b="1" dirty="0" smtClean="0">
-                <a:solidFill>
-                  <a:srgbClr val="000000"/>
-                </a:solidFill>
-              </a:rPr>
-              <a:t>5 </a:t>
-            </a:r>
-            <a:r>
-              <a:rPr lang="en-US" sz="2000" dirty="0">
-                <a:solidFill>
-                  <a:srgbClr val="000000"/>
-                </a:solidFill>
-              </a:rPr>
-              <a:t>(Figure </a:t>
-            </a:r>
-            <a:r>
-              <a:rPr lang="en-US" sz="2000" dirty="0" smtClean="0">
-                <a:solidFill>
-                  <a:srgbClr val="000000"/>
-                </a:solidFill>
-              </a:rPr>
-              <a:t>1; </a:t>
-            </a:r>
-            <a:r>
-              <a:rPr lang="en-US" sz="2000" dirty="0">
-                <a:solidFill>
-                  <a:srgbClr val="000000"/>
-                </a:solidFill>
-              </a:rPr>
-              <a:t>Table </a:t>
-            </a:r>
-            <a:r>
-              <a:rPr lang="en-US" sz="2000" dirty="0">
-                <a:solidFill>
-                  <a:srgbClr val="000000"/>
-                </a:solidFill>
-              </a:rPr>
-              <a:t>1</a:t>
+              <a:t>Table 1</a:t>
             </a:r>
             <a:r>
               <a:rPr lang="en-US" sz="2000" dirty="0" smtClean="0">
@@ -7992,7 +7709,7 @@
                             </p:stCondLst>
                             <p:childTnLst>
                               <p:par>
-                                <p:cTn id="5" presetID="26" presetClass="entr" presetSubtype="0" fill="hold" grpId="0" nodeType="clickEffect">
+                                <p:cTn id="5" presetID="1" presetClass="entr" presetSubtype="0" fill="hold" grpId="0" nodeType="clickEffect">
                                   <p:stCondLst>
                                     <p:cond delay="0"/>
                                   </p:stCondLst>
@@ -8015,257 +7732,6 @@
                                         <p:strVal val="visible"/>
                                       </p:to>
                                     </p:set>
-                                    <p:animEffect transition="in" filter="wipe(down)">
-                                      <p:cBhvr>
-                                        <p:cTn id="7" dur="580">
-                                          <p:stCondLst>
-                                            <p:cond delay="0"/>
-                                          </p:stCondLst>
-                                        </p:cTn>
-                                        <p:tgtEl>
-                                          <p:spTgt spid="6"/>
-                                        </p:tgtEl>
-                                      </p:cBhvr>
-                                    </p:animEffect>
-                                    <p:anim calcmode="lin" valueType="num">
-                                      <p:cBhvr>
-                                        <p:cTn id="8" dur="1822" tmFilter="0,0; 0.14,0.36; 0.43,0.73; 0.71,0.91; 1.0,1.0">
-                                          <p:stCondLst>
-                                            <p:cond delay="0"/>
-                                          </p:stCondLst>
-                                        </p:cTn>
-                                        <p:tgtEl>
-                                          <p:spTgt spid="6"/>
-                                        </p:tgtEl>
-                                        <p:attrNameLst>
-                                          <p:attrName>ppt_x</p:attrName>
-                                        </p:attrNameLst>
-                                      </p:cBhvr>
-                                      <p:tavLst>
-                                        <p:tav tm="0">
-                                          <p:val>
-                                            <p:strVal val="#ppt_x-0.25"/>
-                                          </p:val>
-                                        </p:tav>
-                                        <p:tav tm="100000">
-                                          <p:val>
-                                            <p:strVal val="#ppt_x"/>
-                                          </p:val>
-                                        </p:tav>
-                                      </p:tavLst>
-                                    </p:anim>
-                                    <p:anim calcmode="lin" valueType="num">
-                                      <p:cBhvr>
-                                        <p:cTn id="9" dur="664" tmFilter="0.0,0.0; 0.25,0.07; 0.50,0.2; 0.75,0.467; 1.0,1.0">
-                                          <p:stCondLst>
-                                            <p:cond delay="0"/>
-                                          </p:stCondLst>
-                                        </p:cTn>
-                                        <p:tgtEl>
-                                          <p:spTgt spid="6"/>
-                                        </p:tgtEl>
-                                        <p:attrNameLst>
-                                          <p:attrName>ppt_y</p:attrName>
-                                        </p:attrNameLst>
-                                      </p:cBhvr>
-                                      <p:tavLst>
-                                        <p:tav tm="0" fmla="#ppt_y-sin(pi*$)/3">
-                                          <p:val>
-                                            <p:fltVal val="0.5"/>
-                                          </p:val>
-                                        </p:tav>
-                                        <p:tav tm="100000">
-                                          <p:val>
-                                            <p:fltVal val="1"/>
-                                          </p:val>
-                                        </p:tav>
-                                      </p:tavLst>
-                                    </p:anim>
-                                    <p:anim calcmode="lin" valueType="num">
-                                      <p:cBhvr>
-                                        <p:cTn id="10" dur="664" tmFilter="0, 0; 0.125,0.2665; 0.25,0.4; 0.375,0.465; 0.5,0.5;  0.625,0.535; 0.75,0.6; 0.875,0.7335; 1,1">
-                                          <p:stCondLst>
-                                            <p:cond delay="664"/>
-                                          </p:stCondLst>
-                                        </p:cTn>
-                                        <p:tgtEl>
-                                          <p:spTgt spid="6"/>
-                                        </p:tgtEl>
-                                        <p:attrNameLst>
-                                          <p:attrName>ppt_y</p:attrName>
-                                        </p:attrNameLst>
-                                      </p:cBhvr>
-                                      <p:tavLst>
-                                        <p:tav tm="0" fmla="#ppt_y-sin(pi*$)/9">
-                                          <p:val>
-                                            <p:fltVal val="0"/>
-                                          </p:val>
-                                        </p:tav>
-                                        <p:tav tm="100000">
-                                          <p:val>
-                                            <p:fltVal val="1"/>
-                                          </p:val>
-                                        </p:tav>
-                                      </p:tavLst>
-                                    </p:anim>
-                                    <p:anim calcmode="lin" valueType="num">
-                                      <p:cBhvr>
-                                        <p:cTn id="11" dur="332" tmFilter="0, 0; 0.125,0.2665; 0.25,0.4; 0.375,0.465; 0.5,0.5;  0.625,0.535; 0.75,0.6; 0.875,0.7335; 1,1">
-                                          <p:stCondLst>
-                                            <p:cond delay="1324"/>
-                                          </p:stCondLst>
-                                        </p:cTn>
-                                        <p:tgtEl>
-                                          <p:spTgt spid="6"/>
-                                        </p:tgtEl>
-                                        <p:attrNameLst>
-                                          <p:attrName>ppt_y</p:attrName>
-                                        </p:attrNameLst>
-                                      </p:cBhvr>
-                                      <p:tavLst>
-                                        <p:tav tm="0" fmla="#ppt_y-sin(pi*$)/27">
-                                          <p:val>
-                                            <p:fltVal val="0"/>
-                                          </p:val>
-                                        </p:tav>
-                                        <p:tav tm="100000">
-                                          <p:val>
-                                            <p:fltVal val="1"/>
-                                          </p:val>
-                                        </p:tav>
-                                      </p:tavLst>
-                                    </p:anim>
-                                    <p:anim calcmode="lin" valueType="num">
-                                      <p:cBhvr>
-                                        <p:cTn id="12" dur="164" tmFilter="0, 0; 0.125,0.2665; 0.25,0.4; 0.375,0.465; 0.5,0.5;  0.625,0.535; 0.75,0.6; 0.875,0.7335; 1,1">
-                                          <p:stCondLst>
-                                            <p:cond delay="1656"/>
-                                          </p:stCondLst>
-                                        </p:cTn>
-                                        <p:tgtEl>
-                                          <p:spTgt spid="6"/>
-                                        </p:tgtEl>
-                                        <p:attrNameLst>
-                                          <p:attrName>ppt_y</p:attrName>
-                                        </p:attrNameLst>
-                                      </p:cBhvr>
-                                      <p:tavLst>
-                                        <p:tav tm="0" fmla="#ppt_y-sin(pi*$)/81">
-                                          <p:val>
-                                            <p:fltVal val="0"/>
-                                          </p:val>
-                                        </p:tav>
-                                        <p:tav tm="100000">
-                                          <p:val>
-                                            <p:fltVal val="1"/>
-                                          </p:val>
-                                        </p:tav>
-                                      </p:tavLst>
-                                    </p:anim>
-                                    <p:animScale>
-                                      <p:cBhvr>
-                                        <p:cTn id="13" dur="26">
-                                          <p:stCondLst>
-                                            <p:cond delay="650"/>
-                                          </p:stCondLst>
-                                        </p:cTn>
-                                        <p:tgtEl>
-                                          <p:spTgt spid="6"/>
-                                        </p:tgtEl>
-                                      </p:cBhvr>
-                                      <p:to x="100000" y="60000"/>
-                                    </p:animScale>
-                                    <p:animScale>
-                                      <p:cBhvr>
-                                        <p:cTn id="14" dur="166" decel="50000">
-                                          <p:stCondLst>
-                                            <p:cond delay="676"/>
-                                          </p:stCondLst>
-                                        </p:cTn>
-                                        <p:tgtEl>
-                                          <p:spTgt spid="6"/>
-                                        </p:tgtEl>
-                                      </p:cBhvr>
-                                      <p:to x="100000" y="100000"/>
-                                    </p:animScale>
-                                    <p:animScale>
-                                      <p:cBhvr>
-                                        <p:cTn id="15" dur="26">
-                                          <p:stCondLst>
-                                            <p:cond delay="1312"/>
-                                          </p:stCondLst>
-                                        </p:cTn>
-                                        <p:tgtEl>
-                                          <p:spTgt spid="6"/>
-                                        </p:tgtEl>
-                                      </p:cBhvr>
-                                      <p:to x="100000" y="80000"/>
-                                    </p:animScale>
-                                    <p:animScale>
-                                      <p:cBhvr>
-                                        <p:cTn id="16" dur="166" decel="50000">
-                                          <p:stCondLst>
-                                            <p:cond delay="1338"/>
-                                          </p:stCondLst>
-                                        </p:cTn>
-                                        <p:tgtEl>
-                                          <p:spTgt spid="6"/>
-                                        </p:tgtEl>
-                                      </p:cBhvr>
-                                      <p:to x="100000" y="100000"/>
-                                    </p:animScale>
-                                    <p:animScale>
-                                      <p:cBhvr>
-                                        <p:cTn id="17" dur="26">
-                                          <p:stCondLst>
-                                            <p:cond delay="1642"/>
-                                          </p:stCondLst>
-                                        </p:cTn>
-                                        <p:tgtEl>
-                                          <p:spTgt spid="6"/>
-                                        </p:tgtEl>
-                                      </p:cBhvr>
-                                      <p:to x="100000" y="90000"/>
-                                    </p:animScale>
-                                    <p:animScale>
-                                      <p:cBhvr>
-                                        <p:cTn id="18" dur="166" decel="50000">
-                                          <p:stCondLst>
-                                            <p:cond delay="1668"/>
-                                          </p:stCondLst>
-                                        </p:cTn>
-                                        <p:tgtEl>
-                                          <p:spTgt spid="6"/>
-                                        </p:tgtEl>
-                                      </p:cBhvr>
-                                      <p:to x="100000" y="100000"/>
-                                    </p:animScale>
-                                    <p:animScale>
-                                      <p:cBhvr>
-                                        <p:cTn id="19" dur="26">
-                                          <p:stCondLst>
-                                            <p:cond delay="1808"/>
-                                          </p:stCondLst>
-                                        </p:cTn>
-                                        <p:tgtEl>
-                                          <p:spTgt spid="6"/>
-                                        </p:tgtEl>
-                                      </p:cBhvr>
-                                      <p:to x="100000" y="95000"/>
-                                    </p:animScale>
-                                    <p:animScale>
-                                      <p:cBhvr>
-                                        <p:cTn id="20" dur="166" decel="50000">
-                                          <p:stCondLst>
-                                            <p:cond delay="1834"/>
-                                          </p:stCondLst>
-                                        </p:cTn>
-                                        <p:tgtEl>
-                                          <p:spTgt spid="6"/>
-                                        </p:tgtEl>
-                                      </p:cBhvr>
-                                      <p:to x="100000" y="100000"/>
-                                    </p:animScale>
                                   </p:childTnLst>
                                 </p:cTn>
                               </p:par>
@@ -8492,7 +7958,55 @@
                   <a:srgbClr val="000000"/>
                 </a:solidFill>
               </a:rPr>
-              <a:t>average </a:t>
+              <a:t>average August temperatures is </a:t>
+            </a:r>
+            <a:r>
+              <a:rPr lang="en-US" sz="2000" b="1" dirty="0" smtClean="0">
+                <a:solidFill>
+                  <a:srgbClr val="000000"/>
+                </a:solidFill>
+              </a:rPr>
+              <a:t>approximately symmetric </a:t>
+            </a:r>
+            <a:r>
+              <a:rPr lang="en-US" sz="2000" dirty="0">
+                <a:solidFill>
+                  <a:srgbClr val="000000"/>
+                </a:solidFill>
+              </a:rPr>
+              <a:t>with</a:t>
+            </a:r>
+            <a:r>
+              <a:rPr lang="en-US" sz="2000" b="1" dirty="0">
+                <a:solidFill>
+                  <a:srgbClr val="000000"/>
+                </a:solidFill>
+              </a:rPr>
+              <a:t> </a:t>
+            </a:r>
+            <a:r>
+              <a:rPr lang="en-US" sz="2000" b="1" dirty="0" smtClean="0">
+                <a:solidFill>
+                  <a:srgbClr val="000000"/>
+                </a:solidFill>
+              </a:rPr>
+              <a:t>no </a:t>
+            </a:r>
+            <a:r>
+              <a:rPr lang="en-US" sz="2000" b="1" dirty="0">
+                <a:solidFill>
+                  <a:srgbClr val="000000"/>
+                </a:solidFill>
+              </a:rPr>
+              <a:t>obvious </a:t>
+            </a:r>
+            <a:r>
+              <a:rPr lang="en-US" sz="2000" b="1" dirty="0" smtClean="0">
+                <a:solidFill>
+                  <a:srgbClr val="000000"/>
+                </a:solidFill>
+              </a:rPr>
+              <a:t>outliers</a:t>
             </a:r>
             <a:r>
               <a:rPr lang="en-US" sz="2000" dirty="0" smtClean="0">
@@ -8500,7 +8014,15 @@
                   <a:srgbClr val="000000"/>
                 </a:solidFill>
               </a:rPr>
-              <a:t>August temperatures </a:t>
+              <a:t>, </a:t>
+            </a:r>
+            <a:r>
+              <a:rPr lang="en-US" sz="2000" dirty="0">
+                <a:solidFill>
+                  <a:srgbClr val="000000"/>
+                </a:solidFill>
+              </a:rPr>
+              <a:t>centered on a </a:t>
             </a:r>
             <a:r>
               <a:rPr lang="en-US" sz="2000" dirty="0" smtClean="0">
@@ -8508,7 +8030,15 @@
                   <a:srgbClr val="000000"/>
                 </a:solidFill>
               </a:rPr>
-              <a:t>is </a:t>
+              <a:t>mean </a:t>
+            </a:r>
+            <a:r>
+              <a:rPr lang="en-US" sz="2000" dirty="0">
+                <a:solidFill>
+                  <a:srgbClr val="000000"/>
+                </a:solidFill>
+              </a:rPr>
+              <a:t>of </a:t>
             </a:r>
             <a:r>
               <a:rPr lang="en-US" sz="2000" b="1" dirty="0" smtClean="0">
@@ -8516,7 +8046,31 @@
                   <a:srgbClr val="000000"/>
                 </a:solidFill>
               </a:rPr>
-              <a:t>approximately symmetric</a:t>
+              <a:t>75.4</a:t>
+            </a:r>
+            <a:r>
+              <a:rPr lang="en-US" sz="2000" dirty="0" smtClean="0">
+                <a:solidFill>
+                  <a:srgbClr val="000000"/>
+                </a:solidFill>
+              </a:rPr>
+              <a:t>, </a:t>
+            </a:r>
+            <a:r>
+              <a:rPr lang="en-US" sz="2000" dirty="0">
+                <a:solidFill>
+                  <a:srgbClr val="000000"/>
+                </a:solidFill>
+              </a:rPr>
+              <a:t>with </a:t>
+            </a:r>
+            <a:r>
+              <a:rPr lang="en-US" sz="2000" dirty="0" smtClean="0">
+                <a:solidFill>
+                  <a:srgbClr val="000000"/>
+                </a:solidFill>
+              </a:rPr>
+              <a:t>a standard deviation of </a:t>
             </a:r>
             <a:r>
               <a:rPr lang="en-US" sz="2000" b="1" dirty="0" smtClean="0">
@@ -8524,7 +8078,7 @@
                   <a:srgbClr val="000000"/>
                 </a:solidFill>
               </a:rPr>
-              <a:t> </a:t>
+              <a:t>7.2 </a:t>
             </a:r>
             <a:r>
               <a:rPr lang="en-US" sz="2000" dirty="0">
@@ -8532,47 +8086,55 @@
                   <a:srgbClr val="000000"/>
                 </a:solidFill>
               </a:rPr>
-              <a:t>with</a:t>
-            </a:r>
-            <a:r>
-              <a:rPr lang="en-US" sz="2000" b="1" dirty="0">
+              <a:t>(Figure 2</a:t>
+            </a:r>
+            <a:r>
+              <a:rPr lang="en-US" sz="2000" dirty="0" smtClean="0">
                 <a:solidFill>
                   <a:srgbClr val="000000"/>
                 </a:solidFill>
               </a:rPr>
-              <a:t> </a:t>
-            </a:r>
-            <a:r>
-              <a:rPr lang="en-US" sz="2000" b="1" dirty="0" smtClean="0">
+              <a:t>; </a:t>
+            </a:r>
+            <a:r>
+              <a:rPr lang="en-US" sz="2000" dirty="0">
                 <a:solidFill>
                   <a:srgbClr val="000000"/>
                 </a:solidFill>
               </a:rPr>
-              <a:t>no</a:t>
-            </a:r>
-            <a:r>
-              <a:rPr lang="en-US" sz="2000" b="1" dirty="0" smtClean="0">
+              <a:t>Table </a:t>
+            </a:r>
+            <a:r>
+              <a:rPr lang="en-US" sz="2000" dirty="0" smtClean="0">
                 <a:solidFill>
                   <a:srgbClr val="000000"/>
                 </a:solidFill>
               </a:rPr>
-              <a:t> </a:t>
-            </a:r>
-            <a:r>
-              <a:rPr lang="en-US" sz="2000" b="1" dirty="0">
+              <a:t>2).  I used </a:t>
+            </a:r>
+            <a:r>
+              <a:rPr lang="en-US" sz="2000" dirty="0">
                 <a:solidFill>
                   <a:srgbClr val="000000"/>
                 </a:solidFill>
               </a:rPr>
-              <a:t>obvious </a:t>
-            </a:r>
-            <a:r>
-              <a:rPr lang="en-US" sz="2000" b="1" dirty="0" smtClean="0">
+              <a:t>the </a:t>
+            </a:r>
+            <a:r>
+              <a:rPr lang="en-US" sz="2000" dirty="0" smtClean="0">
                 <a:solidFill>
                   <a:srgbClr val="000000"/>
                 </a:solidFill>
               </a:rPr>
-              <a:t>outliers</a:t>
+              <a:t>mean and standard deviation </a:t>
+            </a:r>
+            <a:r>
+              <a:rPr lang="en-US" sz="2000" dirty="0">
+                <a:solidFill>
+                  <a:srgbClr val="000000"/>
+                </a:solidFill>
+              </a:rPr>
+              <a:t>as measures of center and dispersion because </a:t>
             </a:r>
             <a:r>
               <a:rPr lang="en-US" sz="2000" dirty="0" smtClean="0">
@@ -8580,151 +8142,7 @@
                   <a:srgbClr val="000000"/>
                 </a:solidFill>
               </a:rPr>
-              <a:t>, </a:t>
-            </a:r>
-            <a:r>
-              <a:rPr lang="en-US" sz="2000" dirty="0">
-                <a:solidFill>
-                  <a:srgbClr val="000000"/>
-                </a:solidFill>
-              </a:rPr>
-              <a:t>centered on a </a:t>
-            </a:r>
-            <a:r>
-              <a:rPr lang="en-US" sz="2000" dirty="0" smtClean="0">
-                <a:solidFill>
-                  <a:srgbClr val="000000"/>
-                </a:solidFill>
-              </a:rPr>
-              <a:t>mean </a:t>
-            </a:r>
-            <a:r>
-              <a:rPr lang="en-US" sz="2000" dirty="0">
-                <a:solidFill>
-                  <a:srgbClr val="000000"/>
-                </a:solidFill>
-              </a:rPr>
-              <a:t>of </a:t>
-            </a:r>
-            <a:r>
-              <a:rPr lang="en-US" sz="2000" b="1" dirty="0" smtClean="0">
-                <a:solidFill>
-                  <a:srgbClr val="000000"/>
-                </a:solidFill>
-              </a:rPr>
-              <a:t>75.4</a:t>
-            </a:r>
-            <a:r>
-              <a:rPr lang="en-US" sz="2000" dirty="0" smtClean="0">
-                <a:solidFill>
-                  <a:srgbClr val="000000"/>
-                </a:solidFill>
-              </a:rPr>
-              <a:t>, </a:t>
-            </a:r>
-            <a:r>
-              <a:rPr lang="en-US" sz="2000" dirty="0">
-                <a:solidFill>
-                  <a:srgbClr val="000000"/>
-                </a:solidFill>
-              </a:rPr>
-              <a:t>with </a:t>
-            </a:r>
-            <a:r>
-              <a:rPr lang="en-US" sz="2000" dirty="0" smtClean="0">
-                <a:solidFill>
-                  <a:srgbClr val="000000"/>
-                </a:solidFill>
-              </a:rPr>
-              <a:t>a standard deviation of </a:t>
-            </a:r>
-            <a:r>
-              <a:rPr lang="en-US" sz="2000" b="1" dirty="0" smtClean="0">
-                <a:solidFill>
-                  <a:srgbClr val="000000"/>
-                </a:solidFill>
-              </a:rPr>
-              <a:t>7.2 </a:t>
-            </a:r>
-            <a:r>
-              <a:rPr lang="en-US" sz="2000" dirty="0">
-                <a:solidFill>
-                  <a:srgbClr val="000000"/>
-                </a:solidFill>
-              </a:rPr>
-              <a:t>(Figure </a:t>
-            </a:r>
-            <a:r>
-              <a:rPr lang="en-US" sz="2000" dirty="0">
-                <a:solidFill>
-                  <a:srgbClr val="000000"/>
-                </a:solidFill>
-              </a:rPr>
-              <a:t>2</a:t>
-            </a:r>
-            <a:r>
-              <a:rPr lang="en-US" sz="2000" dirty="0" smtClean="0">
-                <a:solidFill>
-                  <a:srgbClr val="000000"/>
-                </a:solidFill>
-              </a:rPr>
-              <a:t>; </a:t>
-            </a:r>
-            <a:r>
-              <a:rPr lang="en-US" sz="2000" dirty="0">
-                <a:solidFill>
-                  <a:srgbClr val="000000"/>
-                </a:solidFill>
-              </a:rPr>
-              <a:t>Table </a:t>
-            </a:r>
-            <a:r>
-              <a:rPr lang="en-US" sz="2000" dirty="0" smtClean="0">
-                <a:solidFill>
-                  <a:srgbClr val="000000"/>
-                </a:solidFill>
-              </a:rPr>
-              <a:t>2).  I used </a:t>
-            </a:r>
-            <a:r>
-              <a:rPr lang="en-US" sz="2000" dirty="0">
-                <a:solidFill>
-                  <a:srgbClr val="000000"/>
-                </a:solidFill>
-              </a:rPr>
-              <a:t>the </a:t>
-            </a:r>
-            <a:r>
-              <a:rPr lang="en-US" sz="2000" dirty="0" smtClean="0">
-                <a:solidFill>
-                  <a:srgbClr val="000000"/>
-                </a:solidFill>
-              </a:rPr>
-              <a:t>mean and standard deviation </a:t>
-            </a:r>
-            <a:r>
-              <a:rPr lang="en-US" sz="2000" dirty="0">
-                <a:solidFill>
-                  <a:srgbClr val="000000"/>
-                </a:solidFill>
-              </a:rPr>
-              <a:t>as measures of center and dispersion because </a:t>
-            </a:r>
-            <a:r>
-              <a:rPr lang="en-US" sz="2000" dirty="0" smtClean="0">
-                <a:solidFill>
-                  <a:srgbClr val="000000"/>
-                </a:solidFill>
-              </a:rPr>
-              <a:t>no</a:t>
-            </a:r>
-            <a:r>
-              <a:rPr lang="en-US" sz="2000" dirty="0" smtClean="0">
-                <a:solidFill>
-                  <a:srgbClr val="000000"/>
-                </a:solidFill>
-              </a:rPr>
-              <a:t> outliers were present </a:t>
+              <a:t>no outliers were present </a:t>
             </a:r>
             <a:r>
               <a:rPr lang="en-US" sz="2000" dirty="0">
@@ -8781,7 +8199,7 @@
                             </p:stCondLst>
                             <p:childTnLst>
                               <p:par>
-                                <p:cTn id="5" presetID="26" presetClass="entr" presetSubtype="0" fill="hold" grpId="0" nodeType="clickEffect">
+                                <p:cTn id="5" presetID="1" presetClass="entr" presetSubtype="0" fill="hold" grpId="0" nodeType="clickEffect">
                                   <p:stCondLst>
                                     <p:cond delay="0"/>
                                   </p:stCondLst>
@@ -8804,257 +8222,6 @@
                                         <p:strVal val="visible"/>
                                       </p:to>
                                     </p:set>
-                                    <p:animEffect transition="in" filter="wipe(down)">
-                                      <p:cBhvr>
-                                        <p:cTn id="7" dur="580">
-                                          <p:stCondLst>
-                                            <p:cond delay="0"/>
-                                          </p:stCondLst>
-                                        </p:cTn>
-                                        <p:tgtEl>
-                                          <p:spTgt spid="6"/>
-                                        </p:tgtEl>
-                                      </p:cBhvr>
-                                    </p:animEffect>
-                                    <p:anim calcmode="lin" valueType="num">
-                                      <p:cBhvr>
-                                        <p:cTn id="8" dur="1822" tmFilter="0,0; 0.14,0.36; 0.43,0.73; 0.71,0.91; 1.0,1.0">
-                                          <p:stCondLst>
-                                            <p:cond delay="0"/>
-                                          </p:stCondLst>
-                                        </p:cTn>
-                                        <p:tgtEl>
-                                          <p:spTgt spid="6"/>
-                                        </p:tgtEl>
-                                        <p:attrNameLst>
-                                          <p:attrName>ppt_x</p:attrName>
-                                        </p:attrNameLst>
-                                      </p:cBhvr>
-                                      <p:tavLst>
-                                        <p:tav tm="0">
-                                          <p:val>
-                                            <p:strVal val="#ppt_x-0.25"/>
-                                          </p:val>
-                                        </p:tav>
-                                        <p:tav tm="100000">
-                                          <p:val>
-                                            <p:strVal val="#ppt_x"/>
-                                          </p:val>
-                                        </p:tav>
-                                      </p:tavLst>
-                                    </p:anim>
-                                    <p:anim calcmode="lin" valueType="num">
-                                      <p:cBhvr>
-                                        <p:cTn id="9" dur="664" tmFilter="0.0,0.0; 0.25,0.07; 0.50,0.2; 0.75,0.467; 1.0,1.0">
-                                          <p:stCondLst>
-                                            <p:cond delay="0"/>
-                                          </p:stCondLst>
-                                        </p:cTn>
-                                        <p:tgtEl>
-                                          <p:spTgt spid="6"/>
-                                        </p:tgtEl>
-                                        <p:attrNameLst>
-                                          <p:attrName>ppt_y</p:attrName>
-                                        </p:attrNameLst>
-                                      </p:cBhvr>
-                                      <p:tavLst>
-                                        <p:tav tm="0" fmla="#ppt_y-sin(pi*$)/3">
-                                          <p:val>
-                                            <p:fltVal val="0.5"/>
-                                          </p:val>
-                                        </p:tav>
-                                        <p:tav tm="100000">
-                                          <p:val>
-                                            <p:fltVal val="1"/>
-                                          </p:val>
-                                        </p:tav>
-                                      </p:tavLst>
-                                    </p:anim>
-                                    <p:anim calcmode="lin" valueType="num">
-                                      <p:cBhvr>
-                                        <p:cTn id="10" dur="664" tmFilter="0, 0; 0.125,0.2665; 0.25,0.4; 0.375,0.465; 0.5,0.5;  0.625,0.535; 0.75,0.6; 0.875,0.7335; 1,1">
-                                          <p:stCondLst>
-                                            <p:cond delay="664"/>
-                                          </p:stCondLst>
-                                        </p:cTn>
-                                        <p:tgtEl>
-                                          <p:spTgt spid="6"/>
-                                        </p:tgtEl>
-                                        <p:attrNameLst>
-                                          <p:attrName>ppt_y</p:attrName>
-                                        </p:attrNameLst>
-                                      </p:cBhvr>
-                                      <p:tavLst>
-                                        <p:tav tm="0" fmla="#ppt_y-sin(pi*$)/9">
-                                          <p:val>
-                                            <p:fltVal val="0"/>
-                                          </p:val>
-                                        </p:tav>
-                                        <p:tav tm="100000">
-                                          <p:val>
-                                            <p:fltVal val="1"/>
-                                          </p:val>
-                                        </p:tav>
-                                      </p:tavLst>
-                                    </p:anim>
-                                    <p:anim calcmode="lin" valueType="num">
-                                      <p:cBhvr>
-                                        <p:cTn id="11" dur="332" tmFilter="0, 0; 0.125,0.2665; 0.25,0.4; 0.375,0.465; 0.5,0.5;  0.625,0.535; 0.75,0.6; 0.875,0.7335; 1,1">
-                                          <p:stCondLst>
-                                            <p:cond delay="1324"/>
-                                          </p:stCondLst>
-                                        </p:cTn>
-                                        <p:tgtEl>
-                                          <p:spTgt spid="6"/>
-                                        </p:tgtEl>
-                                        <p:attrNameLst>
-                                          <p:attrName>ppt_y</p:attrName>
-                                        </p:attrNameLst>
-                                      </p:cBhvr>
-                                      <p:tavLst>
-                                        <p:tav tm="0" fmla="#ppt_y-sin(pi*$)/27">
-                                          <p:val>
-                                            <p:fltVal val="0"/>
-                                          </p:val>
-                                        </p:tav>
-                                        <p:tav tm="100000">
-                                          <p:val>
-                                            <p:fltVal val="1"/>
-                                          </p:val>
-                                        </p:tav>
-                                      </p:tavLst>
-                                    </p:anim>
-                                    <p:anim calcmode="lin" valueType="num">
-                                      <p:cBhvr>
-                                        <p:cTn id="12" dur="164" tmFilter="0, 0; 0.125,0.2665; 0.25,0.4; 0.375,0.465; 0.5,0.5;  0.625,0.535; 0.75,0.6; 0.875,0.7335; 1,1">
-                                          <p:stCondLst>
-                                            <p:cond delay="1656"/>
-                                          </p:stCondLst>
-                                        </p:cTn>
-                                        <p:tgtEl>
-                                          <p:spTgt spid="6"/>
-                                        </p:tgtEl>
-                                        <p:attrNameLst>
-                                          <p:attrName>ppt_y</p:attrName>
-                                        </p:attrNameLst>
-                                      </p:cBhvr>
-                                      <p:tavLst>
-                                        <p:tav tm="0" fmla="#ppt_y-sin(pi*$)/81">
-                                          <p:val>
-                                            <p:fltVal val="0"/>
-                                          </p:val>
-                                        </p:tav>
-                                        <p:tav tm="100000">
-                                          <p:val>
-                                            <p:fltVal val="1"/>
-                                          </p:val>
-                                        </p:tav>
-                                      </p:tavLst>
-                                    </p:anim>
-                                    <p:animScale>
-                                      <p:cBhvr>
-                                        <p:cTn id="13" dur="26">
-                                          <p:stCondLst>
-                                            <p:cond delay="650"/>
-                                          </p:stCondLst>
-                                        </p:cTn>
-                                        <p:tgtEl>
-                                          <p:spTgt spid="6"/>
-                                        </p:tgtEl>
-                                      </p:cBhvr>
-                                      <p:to x="100000" y="60000"/>
-                                    </p:animScale>
-                                    <p:animScale>
-                                      <p:cBhvr>
-                                        <p:cTn id="14" dur="166" decel="50000">
-                                          <p:stCondLst>
-                                            <p:cond delay="676"/>
-                                          </p:stCondLst>
-                                        </p:cTn>
-                                        <p:tgtEl>
-                                          <p:spTgt spid="6"/>
-                                        </p:tgtEl>
-                                      </p:cBhvr>
-                                      <p:to x="100000" y="100000"/>
-                                    </p:animScale>
-                                    <p:animScale>
-                                      <p:cBhvr>
-                                        <p:cTn id="15" dur="26">
-                                          <p:stCondLst>
-                                            <p:cond delay="1312"/>
-                                          </p:stCondLst>
-                                        </p:cTn>
-                                        <p:tgtEl>
-                                          <p:spTgt spid="6"/>
-                                        </p:tgtEl>
-                                      </p:cBhvr>
-                                      <p:to x="100000" y="80000"/>
-                                    </p:animScale>
-                                    <p:animScale>
-                                      <p:cBhvr>
-                                        <p:cTn id="16" dur="166" decel="50000">
-                                          <p:stCondLst>
-                                            <p:cond delay="1338"/>
-                                          </p:stCondLst>
-                                        </p:cTn>
-                                        <p:tgtEl>
-                                          <p:spTgt spid="6"/>
-                                        </p:tgtEl>
-                                      </p:cBhvr>
-                                      <p:to x="100000" y="100000"/>
-                                    </p:animScale>
-                                    <p:animScale>
-                                      <p:cBhvr>
-                                        <p:cTn id="17" dur="26">
-                                          <p:stCondLst>
-                                            <p:cond delay="1642"/>
-                                          </p:stCondLst>
-                                        </p:cTn>
-                                        <p:tgtEl>
-                                          <p:spTgt spid="6"/>
-                                        </p:tgtEl>
-                                      </p:cBhvr>
-                                      <p:to x="100000" y="90000"/>
-                                    </p:animScale>
-                                    <p:animScale>
-                                      <p:cBhvr>
-                                        <p:cTn id="18" dur="166" decel="50000">
-                                          <p:stCondLst>
-                                            <p:cond delay="1668"/>
-                                          </p:stCondLst>
-                                        </p:cTn>
-                                        <p:tgtEl>
-                                          <p:spTgt spid="6"/>
-                                        </p:tgtEl>
-                                      </p:cBhvr>
-                                      <p:to x="100000" y="100000"/>
-                                    </p:animScale>
-                                    <p:animScale>
-                                      <p:cBhvr>
-                                        <p:cTn id="19" dur="26">
-                                          <p:stCondLst>
-                                            <p:cond delay="1808"/>
-                                          </p:stCondLst>
-                                        </p:cTn>
-                                        <p:tgtEl>
-                                          <p:spTgt spid="6"/>
-                                        </p:tgtEl>
-                                      </p:cBhvr>
-                                      <p:to x="100000" y="95000"/>
-                                    </p:animScale>
-                                    <p:animScale>
-                                      <p:cBhvr>
-                                        <p:cTn id="20" dur="166" decel="50000">
-                                          <p:stCondLst>
-                                            <p:cond delay="1834"/>
-                                          </p:stCondLst>
-                                        </p:cTn>
-                                        <p:tgtEl>
-                                          <p:spTgt spid="6"/>
-                                        </p:tgtEl>
-                                      </p:cBhvr>
-                                      <p:to x="100000" y="100000"/>
-                                    </p:animScale>
                                   </p:childTnLst>
                                 </p:cTn>
                               </p:par>

</xml_diff>